<commit_message>
Correctly configured default output directory by creating a separate dataBoundSetter.
</commit_message>
<xml_diff>
--- a/docDataValidator/fileInput/Module 1 Slides.pptx
+++ b/docDataValidator/fileInput/Module 1 Slides.pptx
@@ -294,7 +294,7 @@
           <a:p>
             <a:fld id="{C627EE4E-A525-4E11-AACC-EBD41B92D0B3}" type="datetimeFigureOut">
               <a:rPr lang="en-US" smtClean="0"/>
-              <a:t>8/16/2022</a:t>
+              <a:t>4/16/2023</a:t>
             </a:fld>
             <a:endParaRPr lang="en-US"/>
           </a:p>
@@ -492,7 +492,7 @@
           <a:p>
             <a:fld id="{C627EE4E-A525-4E11-AACC-EBD41B92D0B3}" type="datetimeFigureOut">
               <a:rPr lang="en-US" smtClean="0"/>
-              <a:t>8/16/2022</a:t>
+              <a:t>4/16/2023</a:t>
             </a:fld>
             <a:endParaRPr lang="en-US"/>
           </a:p>
@@ -700,7 +700,7 @@
           <a:p>
             <a:fld id="{C627EE4E-A525-4E11-AACC-EBD41B92D0B3}" type="datetimeFigureOut">
               <a:rPr lang="en-US" smtClean="0"/>
-              <a:t>8/16/2022</a:t>
+              <a:t>4/16/2023</a:t>
             </a:fld>
             <a:endParaRPr lang="en-US"/>
           </a:p>
@@ -898,7 +898,7 @@
           <a:p>
             <a:fld id="{C627EE4E-A525-4E11-AACC-EBD41B92D0B3}" type="datetimeFigureOut">
               <a:rPr lang="en-US" smtClean="0"/>
-              <a:t>8/16/2022</a:t>
+              <a:t>4/16/2023</a:t>
             </a:fld>
             <a:endParaRPr lang="en-US"/>
           </a:p>
@@ -1173,7 +1173,7 @@
           <a:p>
             <a:fld id="{C627EE4E-A525-4E11-AACC-EBD41B92D0B3}" type="datetimeFigureOut">
               <a:rPr lang="en-US" smtClean="0"/>
-              <a:t>8/16/2022</a:t>
+              <a:t>4/16/2023</a:t>
             </a:fld>
             <a:endParaRPr lang="en-US"/>
           </a:p>
@@ -1438,7 +1438,7 @@
           <a:p>
             <a:fld id="{C627EE4E-A525-4E11-AACC-EBD41B92D0B3}" type="datetimeFigureOut">
               <a:rPr lang="en-US" smtClean="0"/>
-              <a:t>8/16/2022</a:t>
+              <a:t>4/16/2023</a:t>
             </a:fld>
             <a:endParaRPr lang="en-US"/>
           </a:p>
@@ -1850,7 +1850,7 @@
           <a:p>
             <a:fld id="{C627EE4E-A525-4E11-AACC-EBD41B92D0B3}" type="datetimeFigureOut">
               <a:rPr lang="en-US" smtClean="0"/>
-              <a:t>8/16/2022</a:t>
+              <a:t>4/16/2023</a:t>
             </a:fld>
             <a:endParaRPr lang="en-US"/>
           </a:p>
@@ -1991,7 +1991,7 @@
           <a:p>
             <a:fld id="{C627EE4E-A525-4E11-AACC-EBD41B92D0B3}" type="datetimeFigureOut">
               <a:rPr lang="en-US" smtClean="0"/>
-              <a:t>8/16/2022</a:t>
+              <a:t>4/16/2023</a:t>
             </a:fld>
             <a:endParaRPr lang="en-US"/>
           </a:p>
@@ -2104,7 +2104,7 @@
           <a:p>
             <a:fld id="{C627EE4E-A525-4E11-AACC-EBD41B92D0B3}" type="datetimeFigureOut">
               <a:rPr lang="en-US" smtClean="0"/>
-              <a:t>8/16/2022</a:t>
+              <a:t>4/16/2023</a:t>
             </a:fld>
             <a:endParaRPr lang="en-US"/>
           </a:p>
@@ -2415,7 +2415,7 @@
           <a:p>
             <a:fld id="{C627EE4E-A525-4E11-AACC-EBD41B92D0B3}" type="datetimeFigureOut">
               <a:rPr lang="en-US" smtClean="0"/>
-              <a:t>8/16/2022</a:t>
+              <a:t>4/16/2023</a:t>
             </a:fld>
             <a:endParaRPr lang="en-US"/>
           </a:p>
@@ -2703,7 +2703,7 @@
           <a:p>
             <a:fld id="{C627EE4E-A525-4E11-AACC-EBD41B92D0B3}" type="datetimeFigureOut">
               <a:rPr lang="en-US" smtClean="0"/>
-              <a:t>8/16/2022</a:t>
+              <a:t>4/16/2023</a:t>
             </a:fld>
             <a:endParaRPr lang="en-US"/>
           </a:p>
@@ -2944,7 +2944,7 @@
           <a:p>
             <a:fld id="{C627EE4E-A525-4E11-AACC-EBD41B92D0B3}" type="datetimeFigureOut">
               <a:rPr lang="en-US" smtClean="0"/>
-              <a:t>8/16/2022</a:t>
+              <a:t>4/16/2023</a:t>
             </a:fld>
             <a:endParaRPr lang="en-US"/>
           </a:p>
@@ -3712,7 +3712,7 @@
               <a:buNone/>
             </a:pPr>
             <a:r>
-              <a:rPr lang="en-US" sz="2200"/>
+              <a:rPr lang="en-US" sz="2200" dirty="0"/>
               <a:t> </a:t>
             </a:r>
           </a:p>
@@ -3723,7 +3723,7 @@
               </a:spcBef>
             </a:pPr>
             <a:r>
-              <a:rPr lang="en-US" sz="2200" kern="1200">
+              <a:rPr lang="en-US" sz="2200" kern="1200" dirty="0">
                 <a:latin typeface="+mn-lt"/>
                 <a:ea typeface="+mn-ea"/>
                 <a:cs typeface="+mn-cs"/>
@@ -3733,13 +3733,19 @@
           </a:p>
           <a:p>
             <a:pPr lvl="1"/>
-            <a:endParaRPr lang="en-US" sz="2200"/>
+            <a:endParaRPr lang="en-US" sz="2200" dirty="0"/>
           </a:p>
           <a:p>
             <a:pPr lvl="2">
               <a:buFont typeface="Courier New" panose="02070309020205020404" pitchFamily="49" charset="0"/>
               <a:buChar char="o"/>
             </a:pPr>
+            <a:r>
+              <a:rPr lang="en-US" sz="2200">
+                <a:hlinkClick r:id="rId2"/>
+              </a:rPr>
+              <a:t>https://www.google.com</a:t>
+            </a:r>
             <a:endParaRPr lang="en-US" sz="2200"/>
           </a:p>
           <a:p>
@@ -3747,21 +3753,28 @@
               <a:buFont typeface="Courier New" panose="02070309020205020404" pitchFamily="49" charset="0"/>
               <a:buChar char="o"/>
             </a:pPr>
-            <a:endParaRPr lang="en-US" sz="2200"/>
+            <a:endParaRPr lang="en-US" sz="2200" dirty="0"/>
+          </a:p>
+          <a:p>
+            <a:pPr lvl="2">
+              <a:buFont typeface="Courier New" panose="02070309020205020404" pitchFamily="49" charset="0"/>
+              <a:buChar char="o"/>
+            </a:pPr>
+            <a:endParaRPr lang="en-US" sz="2200" dirty="0"/>
           </a:p>
           <a:p>
             <a:pPr lvl="2"/>
-            <a:endParaRPr lang="en-US" sz="2200"/>
+            <a:endParaRPr lang="en-US" sz="2200" dirty="0"/>
           </a:p>
           <a:p>
             <a:pPr lvl="1"/>
-            <a:endParaRPr lang="en-US" sz="2200"/>
-          </a:p>
-          <a:p>
-            <a:endParaRPr lang="en-US" sz="2200"/>
-          </a:p>
-          <a:p>
-            <a:endParaRPr lang="en-US" sz="2200"/>
+            <a:endParaRPr lang="en-US" sz="2200" dirty="0"/>
+          </a:p>
+          <a:p>
+            <a:endParaRPr lang="en-US" sz="2200" dirty="0"/>
+          </a:p>
+          <a:p>
+            <a:endParaRPr lang="en-US" sz="2200" dirty="0"/>
           </a:p>
         </p:txBody>
       </p:sp>
@@ -29633,8 +29646,8 @@
           </a:p>
         </p:txBody>
       </p:sp>
-      <mc:AlternateContent xmlns:mc="http://schemas.openxmlformats.org/markup-compatibility/2006">
-        <mc:Choice xmlns:a14="http://schemas.microsoft.com/office/drawing/2010/main" Requires="a14">
+      <mc:AlternateContent xmlns:mc="http://schemas.openxmlformats.org/markup-compatibility/2006" xmlns:a14="http://schemas.microsoft.com/office/drawing/2010/main">
+        <mc:Choice Requires="a14">
           <p:sp>
             <p:nvSpPr>
               <p:cNvPr id="4" name="Content Placeholder 3">
@@ -30105,7 +30118,7 @@
             </p:txBody>
           </p:sp>
         </mc:Choice>
-        <mc:Fallback>
+        <mc:Fallback xmlns="">
           <p:sp>
             <p:nvSpPr>
               <p:cNvPr id="4" name="Content Placeholder 3">
@@ -30861,8 +30874,8 @@
           </a:p>
         </p:txBody>
       </p:sp>
-      <mc:AlternateContent xmlns:mc="http://schemas.openxmlformats.org/markup-compatibility/2006">
-        <mc:Choice xmlns:a14="http://schemas.microsoft.com/office/drawing/2010/main" Requires="a14">
+      <mc:AlternateContent xmlns:mc="http://schemas.openxmlformats.org/markup-compatibility/2006" xmlns:a14="http://schemas.microsoft.com/office/drawing/2010/main">
+        <mc:Choice Requires="a14">
           <p:sp>
             <p:nvSpPr>
               <p:cNvPr id="4" name="Content Placeholder 3">
@@ -31216,7 +31229,7 @@
             </p:txBody>
           </p:sp>
         </mc:Choice>
-        <mc:Fallback>
+        <mc:Fallback xmlns="">
           <p:sp>
             <p:nvSpPr>
               <p:cNvPr id="4" name="Content Placeholder 3">

</xml_diff>